<commit_message>
Updating Automation Framework Presentation Deck
</commit_message>
<xml_diff>
--- a/AutomationFramewokTaskAssignmentSubmission.pptx
+++ b/AutomationFramewokTaskAssignmentSubmission.pptx
@@ -108,6 +108,11 @@
       </a:defRPr>
     </a:lvl9pPr>
   </p:defaultTextStyle>
+  <p:extLst>
+    <p:ext uri="{EFAFB233-063F-42B5-8137-9DF3F51BA10A}">
+      <p15:sldGuideLst xmlns:p15="http://schemas.microsoft.com/office/powerpoint/2012/main"/>
+    </p:ext>
+  </p:extLst>
 </p:presentation>
 </file>
 
@@ -3067,7 +3072,7 @@
           <a:p>
             <a:fld id="{2F3E8B1C-86EF-43CF-8304-249481088644}" type="datetimeFigureOut">
               <a:rPr lang="en-US" smtClean="0"/>
-              <a:t>10/28/2021</a:t>
+              <a:t>10/29/2021</a:t>
             </a:fld>
             <a:endParaRPr lang="en-US"/>
           </a:p>
@@ -3265,7 +3270,7 @@
           <a:p>
             <a:fld id="{2F3E8B1C-86EF-43CF-8304-249481088644}" type="datetimeFigureOut">
               <a:rPr lang="en-US" smtClean="0"/>
-              <a:t>10/28/2021</a:t>
+              <a:t>10/29/2021</a:t>
             </a:fld>
             <a:endParaRPr lang="en-US"/>
           </a:p>
@@ -3473,7 +3478,7 @@
           <a:p>
             <a:fld id="{2F3E8B1C-86EF-43CF-8304-249481088644}" type="datetimeFigureOut">
               <a:rPr lang="en-US" smtClean="0"/>
-              <a:t>10/28/2021</a:t>
+              <a:t>10/29/2021</a:t>
             </a:fld>
             <a:endParaRPr lang="en-US"/>
           </a:p>
@@ -3671,7 +3676,7 @@
           <a:p>
             <a:fld id="{2F3E8B1C-86EF-43CF-8304-249481088644}" type="datetimeFigureOut">
               <a:rPr lang="en-US" smtClean="0"/>
-              <a:t>10/28/2021</a:t>
+              <a:t>10/29/2021</a:t>
             </a:fld>
             <a:endParaRPr lang="en-US"/>
           </a:p>
@@ -3946,7 +3951,7 @@
           <a:p>
             <a:fld id="{2F3E8B1C-86EF-43CF-8304-249481088644}" type="datetimeFigureOut">
               <a:rPr lang="en-US" smtClean="0"/>
-              <a:t>10/28/2021</a:t>
+              <a:t>10/29/2021</a:t>
             </a:fld>
             <a:endParaRPr lang="en-US"/>
           </a:p>
@@ -4216,7 +4221,7 @@
           <a:p>
             <a:fld id="{2F3E8B1C-86EF-43CF-8304-249481088644}" type="datetimeFigureOut">
               <a:rPr lang="en-US" smtClean="0"/>
-              <a:t>10/28/2021</a:t>
+              <a:t>10/29/2021</a:t>
             </a:fld>
             <a:endParaRPr lang="en-US"/>
           </a:p>
@@ -4636,7 +4641,7 @@
           <a:p>
             <a:fld id="{2F3E8B1C-86EF-43CF-8304-249481088644}" type="datetimeFigureOut">
               <a:rPr lang="en-US" smtClean="0"/>
-              <a:t>10/28/2021</a:t>
+              <a:t>10/29/2021</a:t>
             </a:fld>
             <a:endParaRPr lang="en-US"/>
           </a:p>
@@ -4777,7 +4782,7 @@
           <a:p>
             <a:fld id="{2F3E8B1C-86EF-43CF-8304-249481088644}" type="datetimeFigureOut">
               <a:rPr lang="en-US" smtClean="0"/>
-              <a:t>10/28/2021</a:t>
+              <a:t>10/29/2021</a:t>
             </a:fld>
             <a:endParaRPr lang="en-US"/>
           </a:p>
@@ -4890,7 +4895,7 @@
           <a:p>
             <a:fld id="{2F3E8B1C-86EF-43CF-8304-249481088644}" type="datetimeFigureOut">
               <a:rPr lang="en-US" smtClean="0"/>
-              <a:t>10/28/2021</a:t>
+              <a:t>10/29/2021</a:t>
             </a:fld>
             <a:endParaRPr lang="en-US"/>
           </a:p>
@@ -5201,7 +5206,7 @@
           <a:p>
             <a:fld id="{2F3E8B1C-86EF-43CF-8304-249481088644}" type="datetimeFigureOut">
               <a:rPr lang="en-US" smtClean="0"/>
-              <a:t>10/28/2021</a:t>
+              <a:t>10/29/2021</a:t>
             </a:fld>
             <a:endParaRPr lang="en-US"/>
           </a:p>
@@ -5489,7 +5494,7 @@
           <a:p>
             <a:fld id="{2F3E8B1C-86EF-43CF-8304-249481088644}" type="datetimeFigureOut">
               <a:rPr lang="en-US" smtClean="0"/>
-              <a:t>10/28/2021</a:t>
+              <a:t>10/29/2021</a:t>
             </a:fld>
             <a:endParaRPr lang="en-US"/>
           </a:p>
@@ -5730,7 +5735,7 @@
             <a:fld id="{2F3E8B1C-86EF-43CF-8304-249481088644}" type="datetimeFigureOut">
               <a:rPr lang="en-US" smtClean="0"/>
               <a:pPr/>
-              <a:t>10/28/2021</a:t>
+              <a:t>10/29/2021</a:t>
             </a:fld>
             <a:endParaRPr lang="en-US" dirty="0"/>
           </a:p>
@@ -7309,10 +7314,10 @@
       </p:sp>
       <p:pic>
         <p:nvPicPr>
-          <p:cNvPr id="12" name="Picture 11" descr="Diagram&#10;&#10;Description automatically generated">
+          <p:cNvPr id="3" name="Picture 2">
             <a:extLst>
               <a:ext uri="{FF2B5EF4-FFF2-40B4-BE49-F238E27FC236}">
-                <a16:creationId xmlns:a16="http://schemas.microsoft.com/office/drawing/2014/main" id="{837D1942-4219-43A0-ADB3-C27FC25EF496}"/>
+                <a16:creationId xmlns:a16="http://schemas.microsoft.com/office/drawing/2014/main" id="{E0E102C5-895D-4184-964B-6EFB4E0C50F1}"/>
               </a:ext>
             </a:extLst>
           </p:cNvPr>
@@ -7335,8 +7340,8 @@
         </p:blipFill>
         <p:spPr>
           <a:xfrm>
-            <a:off x="360727" y="0"/>
-            <a:ext cx="11470490" cy="6858379"/>
+            <a:off x="361072" y="0"/>
+            <a:ext cx="11469856" cy="6858000"/>
           </a:xfrm>
           <a:prstGeom prst="rect">
             <a:avLst/>

</xml_diff>

<commit_message>
Test Projects Removed. PPT updated with latest Architecture
</commit_message>
<xml_diff>
--- a/AutomationFramewokTaskAssignmentSubmission.pptx
+++ b/AutomationFramewokTaskAssignmentSubmission.pptx
@@ -3072,7 +3072,7 @@
           <a:p>
             <a:fld id="{2F3E8B1C-86EF-43CF-8304-249481088644}" type="datetimeFigureOut">
               <a:rPr lang="en-US" smtClean="0"/>
-              <a:t>10/29/2021</a:t>
+              <a:t>11/1/2021</a:t>
             </a:fld>
             <a:endParaRPr lang="en-US"/>
           </a:p>
@@ -3270,7 +3270,7 @@
           <a:p>
             <a:fld id="{2F3E8B1C-86EF-43CF-8304-249481088644}" type="datetimeFigureOut">
               <a:rPr lang="en-US" smtClean="0"/>
-              <a:t>10/29/2021</a:t>
+              <a:t>11/1/2021</a:t>
             </a:fld>
             <a:endParaRPr lang="en-US"/>
           </a:p>
@@ -3478,7 +3478,7 @@
           <a:p>
             <a:fld id="{2F3E8B1C-86EF-43CF-8304-249481088644}" type="datetimeFigureOut">
               <a:rPr lang="en-US" smtClean="0"/>
-              <a:t>10/29/2021</a:t>
+              <a:t>11/1/2021</a:t>
             </a:fld>
             <a:endParaRPr lang="en-US"/>
           </a:p>
@@ -3676,7 +3676,7 @@
           <a:p>
             <a:fld id="{2F3E8B1C-86EF-43CF-8304-249481088644}" type="datetimeFigureOut">
               <a:rPr lang="en-US" smtClean="0"/>
-              <a:t>10/29/2021</a:t>
+              <a:t>11/1/2021</a:t>
             </a:fld>
             <a:endParaRPr lang="en-US"/>
           </a:p>
@@ -3951,7 +3951,7 @@
           <a:p>
             <a:fld id="{2F3E8B1C-86EF-43CF-8304-249481088644}" type="datetimeFigureOut">
               <a:rPr lang="en-US" smtClean="0"/>
-              <a:t>10/29/2021</a:t>
+              <a:t>11/1/2021</a:t>
             </a:fld>
             <a:endParaRPr lang="en-US"/>
           </a:p>
@@ -4221,7 +4221,7 @@
           <a:p>
             <a:fld id="{2F3E8B1C-86EF-43CF-8304-249481088644}" type="datetimeFigureOut">
               <a:rPr lang="en-US" smtClean="0"/>
-              <a:t>10/29/2021</a:t>
+              <a:t>11/1/2021</a:t>
             </a:fld>
             <a:endParaRPr lang="en-US"/>
           </a:p>
@@ -4641,7 +4641,7 @@
           <a:p>
             <a:fld id="{2F3E8B1C-86EF-43CF-8304-249481088644}" type="datetimeFigureOut">
               <a:rPr lang="en-US" smtClean="0"/>
-              <a:t>10/29/2021</a:t>
+              <a:t>11/1/2021</a:t>
             </a:fld>
             <a:endParaRPr lang="en-US"/>
           </a:p>
@@ -4782,7 +4782,7 @@
           <a:p>
             <a:fld id="{2F3E8B1C-86EF-43CF-8304-249481088644}" type="datetimeFigureOut">
               <a:rPr lang="en-US" smtClean="0"/>
-              <a:t>10/29/2021</a:t>
+              <a:t>11/1/2021</a:t>
             </a:fld>
             <a:endParaRPr lang="en-US"/>
           </a:p>
@@ -4895,7 +4895,7 @@
           <a:p>
             <a:fld id="{2F3E8B1C-86EF-43CF-8304-249481088644}" type="datetimeFigureOut">
               <a:rPr lang="en-US" smtClean="0"/>
-              <a:t>10/29/2021</a:t>
+              <a:t>11/1/2021</a:t>
             </a:fld>
             <a:endParaRPr lang="en-US"/>
           </a:p>
@@ -5206,7 +5206,7 @@
           <a:p>
             <a:fld id="{2F3E8B1C-86EF-43CF-8304-249481088644}" type="datetimeFigureOut">
               <a:rPr lang="en-US" smtClean="0"/>
-              <a:t>10/29/2021</a:t>
+              <a:t>11/1/2021</a:t>
             </a:fld>
             <a:endParaRPr lang="en-US"/>
           </a:p>
@@ -5494,7 +5494,7 @@
           <a:p>
             <a:fld id="{2F3E8B1C-86EF-43CF-8304-249481088644}" type="datetimeFigureOut">
               <a:rPr lang="en-US" smtClean="0"/>
-              <a:t>10/29/2021</a:t>
+              <a:t>11/1/2021</a:t>
             </a:fld>
             <a:endParaRPr lang="en-US"/>
           </a:p>
@@ -5735,7 +5735,7 @@
             <a:fld id="{2F3E8B1C-86EF-43CF-8304-249481088644}" type="datetimeFigureOut">
               <a:rPr lang="en-US" smtClean="0"/>
               <a:pPr/>
-              <a:t>10/29/2021</a:t>
+              <a:t>11/1/2021</a:t>
             </a:fld>
             <a:endParaRPr lang="en-US" dirty="0"/>
           </a:p>
@@ -6654,7 +6654,7 @@
         </p:spPr>
         <p:txBody>
           <a:bodyPr vert="horz" lIns="91440" tIns="45720" rIns="91440" bIns="45720" rtlCol="0" anchor="b">
-            <a:normAutofit lnSpcReduction="10000"/>
+            <a:normAutofit fontScale="92500"/>
           </a:bodyPr>
           <a:lstStyle>
             <a:lvl1pPr marL="0" indent="0" algn="l" defTabSz="914400" rtl="0" eaLnBrk="1" latinLnBrk="0" hangingPunct="1">
@@ -6823,7 +6823,7 @@
           <a:p>
             <a:r>
               <a:rPr lang="en-IN" dirty="0"/>
-              <a:t>28-Oct-2021</a:t>
+              <a:t>01-Nov-2021</a:t>
             </a:r>
             <a:endParaRPr lang="en-US" dirty="0"/>
           </a:p>
@@ -7050,6 +7050,55 @@
           <a:chExt cx="0" cy="0"/>
         </a:xfrm>
       </p:grpSpPr>
+      <p:sp>
+        <p:nvSpPr>
+          <p:cNvPr id="7" name="Rectangle 6">
+            <a:extLst>
+              <a:ext uri="{FF2B5EF4-FFF2-40B4-BE49-F238E27FC236}">
+                <a16:creationId xmlns:a16="http://schemas.microsoft.com/office/drawing/2014/main" id="{20604614-7113-4181-8E9C-C90FEDF1594C}"/>
+              </a:ext>
+            </a:extLst>
+          </p:cNvPr>
+          <p:cNvSpPr/>
+          <p:nvPr/>
+        </p:nvSpPr>
+        <p:spPr>
+          <a:xfrm>
+            <a:off x="360726" y="0"/>
+            <a:ext cx="11831273" cy="6858000"/>
+          </a:xfrm>
+          <a:prstGeom prst="rect">
+            <a:avLst/>
+          </a:prstGeom>
+          <a:solidFill>
+            <a:schemeClr val="bg1"/>
+          </a:solidFill>
+        </p:spPr>
+        <p:style>
+          <a:lnRef idx="2">
+            <a:schemeClr val="accent1">
+              <a:shade val="50000"/>
+            </a:schemeClr>
+          </a:lnRef>
+          <a:fillRef idx="1">
+            <a:schemeClr val="accent1"/>
+          </a:fillRef>
+          <a:effectRef idx="0">
+            <a:schemeClr val="accent1"/>
+          </a:effectRef>
+          <a:fontRef idx="minor">
+            <a:schemeClr val="lt1"/>
+          </a:fontRef>
+        </p:style>
+        <p:txBody>
+          <a:bodyPr rtlCol="0" anchor="ctr"/>
+          <a:lstStyle/>
+          <a:p>
+            <a:pPr algn="ctr"/>
+            <a:endParaRPr lang="en-US"/>
+          </a:p>
+        </p:txBody>
+      </p:sp>
       <p:sp>
         <p:nvSpPr>
           <p:cNvPr id="5" name="TextBox 4">
@@ -7314,10 +7363,10 @@
       </p:sp>
       <p:pic>
         <p:nvPicPr>
-          <p:cNvPr id="3" name="Picture 2">
+          <p:cNvPr id="9" name="Picture 8">
             <a:extLst>
               <a:ext uri="{FF2B5EF4-FFF2-40B4-BE49-F238E27FC236}">
-                <a16:creationId xmlns:a16="http://schemas.microsoft.com/office/drawing/2014/main" id="{E0E102C5-895D-4184-964B-6EFB4E0C50F1}"/>
+                <a16:creationId xmlns:a16="http://schemas.microsoft.com/office/drawing/2014/main" id="{9DE13038-AC57-477B-9AD2-FEB085D94AB7}"/>
               </a:ext>
             </a:extLst>
           </p:cNvPr>
@@ -7327,21 +7376,15 @@
           <p:nvPr/>
         </p:nvPicPr>
         <p:blipFill>
-          <a:blip r:embed="rId2">
-            <a:extLst>
-              <a:ext uri="{28A0092B-C50C-407E-A947-70E740481C1C}">
-                <a14:useLocalDpi xmlns:a14="http://schemas.microsoft.com/office/drawing/2010/main" val="0"/>
-              </a:ext>
-            </a:extLst>
-          </a:blip>
+          <a:blip r:embed="rId2"/>
           <a:stretch>
             <a:fillRect/>
           </a:stretch>
         </p:blipFill>
         <p:spPr>
           <a:xfrm>
-            <a:off x="361072" y="0"/>
-            <a:ext cx="11469856" cy="6858000"/>
+            <a:off x="1266825" y="0"/>
+            <a:ext cx="9658350" cy="6858000"/>
           </a:xfrm>
           <a:prstGeom prst="rect">
             <a:avLst/>
@@ -9448,47 +9491,12 @@
           <a:chExt cx="0" cy="0"/>
         </a:xfrm>
       </p:grpSpPr>
-      <p:sp>
-        <p:nvSpPr>
-          <p:cNvPr id="2" name="Title 1">
+      <p:pic>
+        <p:nvPicPr>
+          <p:cNvPr id="8" name="Picture 7">
             <a:extLst>
               <a:ext uri="{FF2B5EF4-FFF2-40B4-BE49-F238E27FC236}">
-                <a16:creationId xmlns:a16="http://schemas.microsoft.com/office/drawing/2014/main" id="{479CC021-DB08-4C85-952A-821612E06B9C}"/>
-              </a:ext>
-            </a:extLst>
-          </p:cNvPr>
-          <p:cNvSpPr>
-            <a:spLocks noGrp="1"/>
-          </p:cNvSpPr>
-          <p:nvPr>
-            <p:ph type="title"/>
-          </p:nvPr>
-        </p:nvSpPr>
-        <p:spPr/>
-        <p:txBody>
-          <a:bodyPr/>
-          <a:lstStyle/>
-          <a:p>
-            <a:r>
-              <a:rPr lang="en-IN" dirty="0">
-                <a:latin typeface="Arial" panose="020B0604020202020204" pitchFamily="34" charset="0"/>
-                <a:cs typeface="Arial" panose="020B0604020202020204" pitchFamily="34" charset="0"/>
-              </a:rPr>
-              <a:t>Artifacts</a:t>
-            </a:r>
-            <a:endParaRPr lang="en-US" dirty="0">
-              <a:latin typeface="Arial" panose="020B0604020202020204" pitchFamily="34" charset="0"/>
-              <a:cs typeface="Arial" panose="020B0604020202020204" pitchFamily="34" charset="0"/>
-            </a:endParaRPr>
-          </a:p>
-        </p:txBody>
-      </p:sp>
-      <p:pic>
-        <p:nvPicPr>
-          <p:cNvPr id="12" name="Picture 11">
-            <a:extLst>
-              <a:ext uri="{FF2B5EF4-FFF2-40B4-BE49-F238E27FC236}">
-                <a16:creationId xmlns:a16="http://schemas.microsoft.com/office/drawing/2014/main" id="{A374D10F-4BC8-4AF4-821D-305BC01ADCC8}"/>
+                <a16:creationId xmlns:a16="http://schemas.microsoft.com/office/drawing/2014/main" id="{95DA20EF-227A-44B5-BE2A-07BB679767FB}"/>
               </a:ext>
             </a:extLst>
           </p:cNvPr>
@@ -9505,25 +9513,91 @@
         </p:blipFill>
         <p:spPr>
           <a:xfrm>
-            <a:off x="800100" y="3503645"/>
-            <a:ext cx="3676650" cy="2550385"/>
+            <a:off x="184854" y="3544386"/>
+            <a:ext cx="3459999" cy="2853784"/>
           </a:xfrm>
           <a:prstGeom prst="rect">
             <a:avLst/>
           </a:prstGeom>
-          <a:ln>
-            <a:solidFill>
-              <a:schemeClr val="tx1"/>
-            </a:solidFill>
-          </a:ln>
         </p:spPr>
       </p:pic>
+      <p:sp>
+        <p:nvSpPr>
+          <p:cNvPr id="2" name="Title 1">
+            <a:extLst>
+              <a:ext uri="{FF2B5EF4-FFF2-40B4-BE49-F238E27FC236}">
+                <a16:creationId xmlns:a16="http://schemas.microsoft.com/office/drawing/2014/main" id="{479CC021-DB08-4C85-952A-821612E06B9C}"/>
+              </a:ext>
+            </a:extLst>
+          </p:cNvPr>
+          <p:cNvSpPr>
+            <a:spLocks noGrp="1"/>
+          </p:cNvSpPr>
+          <p:nvPr>
+            <p:ph type="title"/>
+          </p:nvPr>
+        </p:nvSpPr>
+        <p:spPr/>
+        <p:txBody>
+          <a:bodyPr/>
+          <a:lstStyle/>
+          <a:p>
+            <a:r>
+              <a:rPr lang="en-IN" dirty="0">
+                <a:latin typeface="Arial" panose="020B0604020202020204" pitchFamily="34" charset="0"/>
+                <a:cs typeface="Arial" panose="020B0604020202020204" pitchFamily="34" charset="0"/>
+              </a:rPr>
+              <a:t>Artifacts</a:t>
+            </a:r>
+            <a:endParaRPr lang="en-US" dirty="0">
+              <a:latin typeface="Arial" panose="020B0604020202020204" pitchFamily="34" charset="0"/>
+              <a:cs typeface="Arial" panose="020B0604020202020204" pitchFamily="34" charset="0"/>
+            </a:endParaRPr>
+          </a:p>
+        </p:txBody>
+      </p:sp>
+      <p:sp>
+        <p:nvSpPr>
+          <p:cNvPr id="21" name="TextBox 20">
+            <a:extLst>
+              <a:ext uri="{FF2B5EF4-FFF2-40B4-BE49-F238E27FC236}">
+                <a16:creationId xmlns:a16="http://schemas.microsoft.com/office/drawing/2014/main" id="{581F896C-A971-4748-989C-E4BE5C01765B}"/>
+              </a:ext>
+            </a:extLst>
+          </p:cNvPr>
+          <p:cNvSpPr txBox="1"/>
+          <p:nvPr/>
+        </p:nvSpPr>
+        <p:spPr>
+          <a:xfrm>
+            <a:off x="1642299" y="4942302"/>
+            <a:ext cx="1968759" cy="646331"/>
+          </a:xfrm>
+          <a:prstGeom prst="rect">
+            <a:avLst/>
+          </a:prstGeom>
+          <a:noFill/>
+        </p:spPr>
+        <p:txBody>
+          <a:bodyPr wrap="square" rtlCol="0">
+            <a:spAutoFit/>
+          </a:bodyPr>
+          <a:lstStyle/>
+          <a:p>
+            <a:r>
+              <a:rPr lang="en-IN" dirty="0"/>
+              <a:t>UI Automation Execution Report</a:t>
+            </a:r>
+            <a:endParaRPr lang="en-US" dirty="0"/>
+          </a:p>
+        </p:txBody>
+      </p:sp>
       <p:pic>
         <p:nvPicPr>
-          <p:cNvPr id="16" name="Picture 15">
+          <p:cNvPr id="4" name="Picture 3">
             <a:extLst>
               <a:ext uri="{FF2B5EF4-FFF2-40B4-BE49-F238E27FC236}">
-                <a16:creationId xmlns:a16="http://schemas.microsoft.com/office/drawing/2014/main" id="{ABBD5DC5-5E38-475F-8890-5DB33C2CF33C}"/>
+                <a16:creationId xmlns:a16="http://schemas.microsoft.com/office/drawing/2014/main" id="{0184818C-74F7-4D32-94DE-424E3BD772EA}"/>
               </a:ext>
             </a:extLst>
           </p:cNvPr>
@@ -9540,25 +9614,20 @@
         </p:blipFill>
         <p:spPr>
           <a:xfrm>
-            <a:off x="800100" y="1607611"/>
-            <a:ext cx="3676650" cy="1914525"/>
+            <a:off x="127243" y="1607610"/>
+            <a:ext cx="3676650" cy="1873924"/>
           </a:xfrm>
           <a:prstGeom prst="rect">
             <a:avLst/>
           </a:prstGeom>
-          <a:ln>
-            <a:solidFill>
-              <a:schemeClr val="tx1"/>
-            </a:solidFill>
-          </a:ln>
         </p:spPr>
       </p:pic>
       <p:pic>
         <p:nvPicPr>
-          <p:cNvPr id="18" name="Picture 17">
+          <p:cNvPr id="6" name="Picture 5">
             <a:extLst>
               <a:ext uri="{FF2B5EF4-FFF2-40B4-BE49-F238E27FC236}">
-                <a16:creationId xmlns:a16="http://schemas.microsoft.com/office/drawing/2014/main" id="{C1B01DAC-D38A-4C53-93C3-2B90660066DD}"/>
+                <a16:creationId xmlns:a16="http://schemas.microsoft.com/office/drawing/2014/main" id="{2434E7D0-879B-48E1-B1A6-D45CAAA0CC43}"/>
               </a:ext>
             </a:extLst>
           </p:cNvPr>
@@ -9575,25 +9644,56 @@
         </p:blipFill>
         <p:spPr>
           <a:xfrm>
-            <a:off x="4501481" y="1607610"/>
-            <a:ext cx="7517999" cy="1966675"/>
+            <a:off x="3803892" y="751268"/>
+            <a:ext cx="3947018" cy="5302762"/>
           </a:xfrm>
           <a:prstGeom prst="rect">
             <a:avLst/>
           </a:prstGeom>
-          <a:ln>
-            <a:solidFill>
-              <a:schemeClr val="tx1"/>
-            </a:solidFill>
-          </a:ln>
         </p:spPr>
       </p:pic>
+      <p:sp>
+        <p:nvSpPr>
+          <p:cNvPr id="22" name="TextBox 21">
+            <a:extLst>
+              <a:ext uri="{FF2B5EF4-FFF2-40B4-BE49-F238E27FC236}">
+                <a16:creationId xmlns:a16="http://schemas.microsoft.com/office/drawing/2014/main" id="{81C43159-9057-473D-8DA9-C202D6F7CF3B}"/>
+              </a:ext>
+            </a:extLst>
+          </p:cNvPr>
+          <p:cNvSpPr txBox="1"/>
+          <p:nvPr/>
+        </p:nvSpPr>
+        <p:spPr>
+          <a:xfrm>
+            <a:off x="5589317" y="4402585"/>
+            <a:ext cx="1968759" cy="646331"/>
+          </a:xfrm>
+          <a:prstGeom prst="rect">
+            <a:avLst/>
+          </a:prstGeom>
+          <a:noFill/>
+        </p:spPr>
+        <p:txBody>
+          <a:bodyPr wrap="square" rtlCol="0">
+            <a:spAutoFit/>
+          </a:bodyPr>
+          <a:lstStyle/>
+          <a:p>
+            <a:r>
+              <a:rPr lang="en-IN" dirty="0"/>
+              <a:t>API Automation Execution Report</a:t>
+            </a:r>
+            <a:endParaRPr lang="en-US" dirty="0"/>
+          </a:p>
+        </p:txBody>
+      </p:sp>
       <p:pic>
         <p:nvPicPr>
-          <p:cNvPr id="20" name="Picture 19">
+          <p:cNvPr id="10" name="Picture 9">
             <a:extLst>
               <a:ext uri="{FF2B5EF4-FFF2-40B4-BE49-F238E27FC236}">
-                <a16:creationId xmlns:a16="http://schemas.microsoft.com/office/drawing/2014/main" id="{748EB9BF-174C-49BA-84EE-5D1D5CD95B22}"/>
+                <a16:creationId xmlns:a16="http://schemas.microsoft.com/office/drawing/2014/main" id="{CC8A4733-CD9F-4712-8A47-44F0AAC6A79E}"/>
               </a:ext>
             </a:extLst>
           </p:cNvPr>
@@ -9610,91 +9710,14 @@
         </p:blipFill>
         <p:spPr>
           <a:xfrm>
-            <a:off x="4501481" y="3579236"/>
-            <a:ext cx="7517999" cy="2474794"/>
+            <a:off x="7882821" y="1106729"/>
+            <a:ext cx="4124325" cy="4829175"/>
           </a:xfrm>
           <a:prstGeom prst="rect">
             <a:avLst/>
           </a:prstGeom>
-          <a:ln>
-            <a:solidFill>
-              <a:schemeClr val="tx1"/>
-            </a:solidFill>
-          </a:ln>
         </p:spPr>
       </p:pic>
-      <p:sp>
-        <p:nvSpPr>
-          <p:cNvPr id="21" name="TextBox 20">
-            <a:extLst>
-              <a:ext uri="{FF2B5EF4-FFF2-40B4-BE49-F238E27FC236}">
-                <a16:creationId xmlns:a16="http://schemas.microsoft.com/office/drawing/2014/main" id="{581F896C-A971-4748-989C-E4BE5C01765B}"/>
-              </a:ext>
-            </a:extLst>
-          </p:cNvPr>
-          <p:cNvSpPr txBox="1"/>
-          <p:nvPr/>
-        </p:nvSpPr>
-        <p:spPr>
-          <a:xfrm>
-            <a:off x="8724121" y="2394548"/>
-            <a:ext cx="1968759" cy="646331"/>
-          </a:xfrm>
-          <a:prstGeom prst="rect">
-            <a:avLst/>
-          </a:prstGeom>
-          <a:noFill/>
-        </p:spPr>
-        <p:txBody>
-          <a:bodyPr wrap="square" rtlCol="0">
-            <a:spAutoFit/>
-          </a:bodyPr>
-          <a:lstStyle/>
-          <a:p>
-            <a:r>
-              <a:rPr lang="en-IN" dirty="0"/>
-              <a:t>UI Automation Execution Report</a:t>
-            </a:r>
-            <a:endParaRPr lang="en-US" dirty="0"/>
-          </a:p>
-        </p:txBody>
-      </p:sp>
-      <p:sp>
-        <p:nvSpPr>
-          <p:cNvPr id="22" name="TextBox 21">
-            <a:extLst>
-              <a:ext uri="{FF2B5EF4-FFF2-40B4-BE49-F238E27FC236}">
-                <a16:creationId xmlns:a16="http://schemas.microsoft.com/office/drawing/2014/main" id="{81C43159-9057-473D-8DA9-C202D6F7CF3B}"/>
-              </a:ext>
-            </a:extLst>
-          </p:cNvPr>
-          <p:cNvSpPr txBox="1"/>
-          <p:nvPr/>
-        </p:nvSpPr>
-        <p:spPr>
-          <a:xfrm>
-            <a:off x="8761442" y="4455671"/>
-            <a:ext cx="1968759" cy="646331"/>
-          </a:xfrm>
-          <a:prstGeom prst="rect">
-            <a:avLst/>
-          </a:prstGeom>
-          <a:noFill/>
-        </p:spPr>
-        <p:txBody>
-          <a:bodyPr wrap="square" rtlCol="0">
-            <a:spAutoFit/>
-          </a:bodyPr>
-          <a:lstStyle/>
-          <a:p>
-            <a:r>
-              <a:rPr lang="en-IN" dirty="0"/>
-              <a:t>API Automation Execution Report</a:t>
-            </a:r>
-            <a:endParaRPr lang="en-US" dirty="0"/>
-          </a:p>
-        </p:txBody>
-      </p:sp>
     </p:spTree>
     <p:extLst>
       <p:ext uri="{BB962C8B-B14F-4D97-AF65-F5344CB8AC3E}">

</xml_diff>

<commit_message>
Presentation deck updated with TC completion
</commit_message>
<xml_diff>
--- a/AutomationFramewokTaskAssignmentSubmission.pptx
+++ b/AutomationFramewokTaskAssignmentSubmission.pptx
@@ -7563,7 +7563,7 @@
           <p:nvPr>
             <p:extLst>
               <p:ext uri="{D42A27DB-BD31-4B8C-83A1-F6EECF244321}">
-                <p14:modId xmlns:p14="http://schemas.microsoft.com/office/powerpoint/2010/main" val="2675992025"/>
+                <p14:modId xmlns:p14="http://schemas.microsoft.com/office/powerpoint/2010/main" val="3145824204"/>
               </p:ext>
             </p:extLst>
           </p:nvPr>
@@ -7979,10 +7979,10 @@
                     <a:p>
                       <a:pPr algn="l" fontAlgn="b"/>
                       <a:r>
-                        <a:rPr lang="en-US" sz="1200" u="none" strike="noStrike" dirty="0" err="1">
+                        <a:rPr lang="en-US" sz="1200" u="none" strike="noStrike" dirty="0">
                           <a:effectLst/>
                         </a:rPr>
-                        <a:t>Inprogress</a:t>
+                        <a:t>Completed</a:t>
                       </a:r>
                       <a:endParaRPr lang="en-US" sz="1200" b="0" i="0" u="none" strike="noStrike" dirty="0">
                         <a:solidFill>
@@ -7995,10 +7995,10 @@
                     <a:p>
                       <a:pPr algn="l" fontAlgn="b"/>
                       <a:r>
-                        <a:rPr lang="en-US" sz="1200" u="none" strike="noStrike" dirty="0" err="1">
+                        <a:rPr lang="en-US" sz="1200" u="none" strike="noStrike" dirty="0">
                           <a:effectLst/>
                         </a:rPr>
-                        <a:t>Inprogress</a:t>
+                        <a:t>Completed</a:t>
                       </a:r>
                       <a:endParaRPr lang="en-US" sz="1200" b="0" i="0" u="none" strike="noStrike" dirty="0">
                         <a:solidFill>
@@ -8011,10 +8011,10 @@
                     <a:p>
                       <a:pPr algn="l" fontAlgn="b"/>
                       <a:r>
-                        <a:rPr lang="en-US" sz="1200" u="none" strike="noStrike" dirty="0" err="1">
+                        <a:rPr lang="en-US" sz="1200" u="none" strike="noStrike" dirty="0">
                           <a:effectLst/>
                         </a:rPr>
-                        <a:t>Inprogress</a:t>
+                        <a:t>Completed</a:t>
                       </a:r>
                       <a:endParaRPr lang="en-US" sz="1200" b="0" i="0" u="none" strike="noStrike" dirty="0">
                         <a:solidFill>
@@ -8071,7 +8071,7 @@
           <p:nvPr>
             <p:extLst>
               <p:ext uri="{D42A27DB-BD31-4B8C-83A1-F6EECF244321}">
-                <p14:modId xmlns:p14="http://schemas.microsoft.com/office/powerpoint/2010/main" val="1447736611"/>
+                <p14:modId xmlns:p14="http://schemas.microsoft.com/office/powerpoint/2010/main" val="4103726432"/>
               </p:ext>
             </p:extLst>
           </p:nvPr>
@@ -8633,12 +8633,12 @@
                     <a:p>
                       <a:pPr algn="l" fontAlgn="b"/>
                       <a:r>
-                        <a:rPr lang="en-US" sz="1100" u="none" strike="noStrike">
+                        <a:rPr lang="en-US" sz="1100" u="none" strike="noStrike" dirty="0">
                           <a:effectLst/>
                         </a:rPr>
-                        <a:t>Inprogress</a:t>
+                        <a:t>Completed</a:t>
                       </a:r>
-                      <a:endParaRPr lang="en-US" sz="1100" b="0" i="0" u="none" strike="noStrike">
+                      <a:endParaRPr lang="en-US" sz="1100" b="0" i="0" u="none" strike="noStrike" dirty="0">
                         <a:solidFill>
                           <a:srgbClr val="000000"/>
                         </a:solidFill>
@@ -8748,12 +8748,12 @@
                     <a:p>
                       <a:pPr algn="l" fontAlgn="b"/>
                       <a:r>
-                        <a:rPr lang="en-US" sz="1100" u="none" strike="noStrike">
+                        <a:rPr lang="en-US" sz="1100" u="none" strike="noStrike" dirty="0">
                           <a:effectLst/>
                         </a:rPr>
-                        <a:t>Inprogress</a:t>
+                        <a:t>Completed</a:t>
                       </a:r>
-                      <a:endParaRPr lang="en-US" sz="1100" b="0" i="0" u="none" strike="noStrike">
+                      <a:endParaRPr lang="en-US" sz="1100" b="0" i="0" u="none" strike="noStrike" dirty="0">
                         <a:solidFill>
                           <a:srgbClr val="000000"/>
                         </a:solidFill>
@@ -8863,12 +8863,12 @@
                     <a:p>
                       <a:pPr algn="l" fontAlgn="b"/>
                       <a:r>
-                        <a:rPr lang="en-US" sz="1100" u="none" strike="noStrike">
+                        <a:rPr lang="en-US" sz="1100" u="none" strike="noStrike" dirty="0">
                           <a:effectLst/>
                         </a:rPr>
-                        <a:t>Inprogress</a:t>
+                        <a:t>Completed</a:t>
                       </a:r>
-                      <a:endParaRPr lang="en-US" sz="1100" b="0" i="0" u="none" strike="noStrike">
+                      <a:endParaRPr lang="en-US" sz="1100" b="0" i="0" u="none" strike="noStrike" dirty="0">
                         <a:solidFill>
                           <a:srgbClr val="000000"/>
                         </a:solidFill>
@@ -8978,12 +8978,12 @@
                     <a:p>
                       <a:pPr algn="l" fontAlgn="b"/>
                       <a:r>
-                        <a:rPr lang="en-US" sz="1100" u="none" strike="noStrike">
+                        <a:rPr lang="en-US" sz="1100" u="none" strike="noStrike" dirty="0">
                           <a:effectLst/>
                         </a:rPr>
-                        <a:t>Inprogress</a:t>
+                        <a:t>Completed</a:t>
                       </a:r>
-                      <a:endParaRPr lang="en-US" sz="1100" b="0" i="0" u="none" strike="noStrike">
+                      <a:endParaRPr lang="en-US" sz="1100" b="0" i="0" u="none" strike="noStrike" dirty="0">
                         <a:solidFill>
                           <a:srgbClr val="000000"/>
                         </a:solidFill>
@@ -9093,12 +9093,12 @@
                     <a:p>
                       <a:pPr algn="l" fontAlgn="b"/>
                       <a:r>
-                        <a:rPr lang="en-US" sz="1100" u="none" strike="noStrike">
+                        <a:rPr lang="en-US" sz="1100" u="none" strike="noStrike" dirty="0">
                           <a:effectLst/>
                         </a:rPr>
-                        <a:t>Inprogress</a:t>
+                        <a:t>Completed</a:t>
                       </a:r>
-                      <a:endParaRPr lang="en-US" sz="1100" b="0" i="0" u="none" strike="noStrike">
+                      <a:endParaRPr lang="en-US" sz="1100" b="0" i="0" u="none" strike="noStrike" dirty="0">
                         <a:solidFill>
                           <a:srgbClr val="000000"/>
                         </a:solidFill>
@@ -9208,12 +9208,12 @@
                     <a:p>
                       <a:pPr algn="l" fontAlgn="b"/>
                       <a:r>
-                        <a:rPr lang="en-US" sz="1100" u="none" strike="noStrike">
+                        <a:rPr lang="en-US" sz="1100" u="none" strike="noStrike" dirty="0">
                           <a:effectLst/>
                         </a:rPr>
-                        <a:t>Inprogress</a:t>
+                        <a:t>Completed</a:t>
                       </a:r>
-                      <a:endParaRPr lang="en-US" sz="1100" b="0" i="0" u="none" strike="noStrike">
+                      <a:endParaRPr lang="en-US" sz="1100" b="0" i="0" u="none" strike="noStrike" dirty="0">
                         <a:solidFill>
                           <a:srgbClr val="000000"/>
                         </a:solidFill>
@@ -9323,10 +9323,10 @@
                     <a:p>
                       <a:pPr algn="l" fontAlgn="b"/>
                       <a:r>
-                        <a:rPr lang="en-US" sz="1100" u="none" strike="noStrike" dirty="0" err="1">
+                        <a:rPr lang="en-US" sz="1100" u="none" strike="noStrike" dirty="0">
                           <a:effectLst/>
                         </a:rPr>
-                        <a:t>Inprogress</a:t>
+                        <a:t>Completed</a:t>
                       </a:r>
                       <a:endParaRPr lang="en-US" sz="1100" b="0" i="0" u="none" strike="noStrike" dirty="0">
                         <a:solidFill>

</xml_diff>

<commit_message>
Updating README.md file with Technology Stack and Suite Execution Video Link
</commit_message>
<xml_diff>
--- a/AutomationFramewokTaskAssignmentSubmission.pptx
+++ b/AutomationFramewokTaskAssignmentSubmission.pptx
@@ -3072,7 +3072,7 @@
           <a:p>
             <a:fld id="{2F3E8B1C-86EF-43CF-8304-249481088644}" type="datetimeFigureOut">
               <a:rPr lang="en-US" smtClean="0"/>
-              <a:t>11/1/2021</a:t>
+              <a:t>11/2/2021</a:t>
             </a:fld>
             <a:endParaRPr lang="en-US"/>
           </a:p>
@@ -3270,7 +3270,7 @@
           <a:p>
             <a:fld id="{2F3E8B1C-86EF-43CF-8304-249481088644}" type="datetimeFigureOut">
               <a:rPr lang="en-US" smtClean="0"/>
-              <a:t>11/1/2021</a:t>
+              <a:t>11/2/2021</a:t>
             </a:fld>
             <a:endParaRPr lang="en-US"/>
           </a:p>
@@ -3478,7 +3478,7 @@
           <a:p>
             <a:fld id="{2F3E8B1C-86EF-43CF-8304-249481088644}" type="datetimeFigureOut">
               <a:rPr lang="en-US" smtClean="0"/>
-              <a:t>11/1/2021</a:t>
+              <a:t>11/2/2021</a:t>
             </a:fld>
             <a:endParaRPr lang="en-US"/>
           </a:p>
@@ -3676,7 +3676,7 @@
           <a:p>
             <a:fld id="{2F3E8B1C-86EF-43CF-8304-249481088644}" type="datetimeFigureOut">
               <a:rPr lang="en-US" smtClean="0"/>
-              <a:t>11/1/2021</a:t>
+              <a:t>11/2/2021</a:t>
             </a:fld>
             <a:endParaRPr lang="en-US"/>
           </a:p>
@@ -3951,7 +3951,7 @@
           <a:p>
             <a:fld id="{2F3E8B1C-86EF-43CF-8304-249481088644}" type="datetimeFigureOut">
               <a:rPr lang="en-US" smtClean="0"/>
-              <a:t>11/1/2021</a:t>
+              <a:t>11/2/2021</a:t>
             </a:fld>
             <a:endParaRPr lang="en-US"/>
           </a:p>
@@ -4221,7 +4221,7 @@
           <a:p>
             <a:fld id="{2F3E8B1C-86EF-43CF-8304-249481088644}" type="datetimeFigureOut">
               <a:rPr lang="en-US" smtClean="0"/>
-              <a:t>11/1/2021</a:t>
+              <a:t>11/2/2021</a:t>
             </a:fld>
             <a:endParaRPr lang="en-US"/>
           </a:p>
@@ -4641,7 +4641,7 @@
           <a:p>
             <a:fld id="{2F3E8B1C-86EF-43CF-8304-249481088644}" type="datetimeFigureOut">
               <a:rPr lang="en-US" smtClean="0"/>
-              <a:t>11/1/2021</a:t>
+              <a:t>11/2/2021</a:t>
             </a:fld>
             <a:endParaRPr lang="en-US"/>
           </a:p>
@@ -4782,7 +4782,7 @@
           <a:p>
             <a:fld id="{2F3E8B1C-86EF-43CF-8304-249481088644}" type="datetimeFigureOut">
               <a:rPr lang="en-US" smtClean="0"/>
-              <a:t>11/1/2021</a:t>
+              <a:t>11/2/2021</a:t>
             </a:fld>
             <a:endParaRPr lang="en-US"/>
           </a:p>
@@ -4895,7 +4895,7 @@
           <a:p>
             <a:fld id="{2F3E8B1C-86EF-43CF-8304-249481088644}" type="datetimeFigureOut">
               <a:rPr lang="en-US" smtClean="0"/>
-              <a:t>11/1/2021</a:t>
+              <a:t>11/2/2021</a:t>
             </a:fld>
             <a:endParaRPr lang="en-US"/>
           </a:p>
@@ -5206,7 +5206,7 @@
           <a:p>
             <a:fld id="{2F3E8B1C-86EF-43CF-8304-249481088644}" type="datetimeFigureOut">
               <a:rPr lang="en-US" smtClean="0"/>
-              <a:t>11/1/2021</a:t>
+              <a:t>11/2/2021</a:t>
             </a:fld>
             <a:endParaRPr lang="en-US"/>
           </a:p>
@@ -5494,7 +5494,7 @@
           <a:p>
             <a:fld id="{2F3E8B1C-86EF-43CF-8304-249481088644}" type="datetimeFigureOut">
               <a:rPr lang="en-US" smtClean="0"/>
-              <a:t>11/1/2021</a:t>
+              <a:t>11/2/2021</a:t>
             </a:fld>
             <a:endParaRPr lang="en-US"/>
           </a:p>
@@ -5735,7 +5735,7 @@
             <a:fld id="{2F3E8B1C-86EF-43CF-8304-249481088644}" type="datetimeFigureOut">
               <a:rPr lang="en-US" smtClean="0"/>
               <a:pPr/>
-              <a:t>11/1/2021</a:t>
+              <a:t>11/2/2021</a:t>
             </a:fld>
             <a:endParaRPr lang="en-US" dirty="0"/>
           </a:p>
@@ -7475,11 +7475,13 @@
         <p:spPr>
           <a:xfrm>
             <a:off x="700634" y="1689119"/>
-            <a:ext cx="4196285" cy="2488598"/>
+            <a:ext cx="4196285" cy="2970612"/>
           </a:xfrm>
         </p:spPr>
         <p:txBody>
-          <a:bodyPr/>
+          <a:bodyPr>
+            <a:normAutofit/>
+          </a:bodyPr>
           <a:lstStyle/>
           <a:p>
             <a:r>
@@ -7538,6 +7540,16 @@
                 <a:cs typeface="Arial" panose="020B0604020202020204" pitchFamily="34" charset="0"/>
               </a:rPr>
               <a:t>Test Assertions</a:t>
+            </a:r>
+          </a:p>
+          <a:p>
+            <a:pPr lvl="1"/>
+            <a:r>
+              <a:rPr lang="en-IN" dirty="0">
+                <a:latin typeface="Arial" panose="020B0604020202020204" pitchFamily="34" charset="0"/>
+                <a:cs typeface="Arial" panose="020B0604020202020204" pitchFamily="34" charset="0"/>
+              </a:rPr>
+              <a:t>Screenshot capture</a:t>
             </a:r>
           </a:p>
           <a:p>
@@ -9373,7 +9385,7 @@
         </p:nvSpPr>
         <p:spPr>
           <a:xfrm>
-            <a:off x="1060899" y="4261797"/>
+            <a:off x="1060899" y="4659731"/>
             <a:ext cx="3836020" cy="1365885"/>
           </a:xfrm>
           <a:prstGeom prst="roundRect">
@@ -9718,6 +9730,93 @@
           </a:prstGeom>
         </p:spPr>
       </p:pic>
+      <p:sp>
+        <p:nvSpPr>
+          <p:cNvPr id="9" name="Rectangle: Rounded Corners 8">
+            <a:extLst>
+              <a:ext uri="{FF2B5EF4-FFF2-40B4-BE49-F238E27FC236}">
+                <a16:creationId xmlns:a16="http://schemas.microsoft.com/office/drawing/2014/main" id="{CC166A26-2088-415A-B9D2-765E0063CB0C}"/>
+              </a:ext>
+            </a:extLst>
+          </p:cNvPr>
+          <p:cNvSpPr/>
+          <p:nvPr/>
+        </p:nvSpPr>
+        <p:spPr>
+          <a:xfrm>
+            <a:off x="2751666" y="6291561"/>
+            <a:ext cx="9131556" cy="387424"/>
+          </a:xfrm>
+          <a:prstGeom prst="roundRect">
+            <a:avLst/>
+          </a:prstGeom>
+          <a:ln>
+            <a:noFill/>
+          </a:ln>
+          <a:effectLst>
+            <a:glow rad="139700">
+              <a:schemeClr val="accent5">
+                <a:satMod val="175000"/>
+                <a:alpha val="40000"/>
+              </a:schemeClr>
+            </a:glow>
+            <a:innerShdw blurRad="63500" dist="50800" dir="18900000">
+              <a:prstClr val="black">
+                <a:alpha val="50000"/>
+              </a:prstClr>
+            </a:innerShdw>
+            <a:softEdge rad="63500"/>
+          </a:effectLst>
+        </p:spPr>
+        <p:style>
+          <a:lnRef idx="1">
+            <a:schemeClr val="accent5"/>
+          </a:lnRef>
+          <a:fillRef idx="2">
+            <a:schemeClr val="accent5"/>
+          </a:fillRef>
+          <a:effectRef idx="1">
+            <a:schemeClr val="accent5"/>
+          </a:effectRef>
+          <a:fontRef idx="minor">
+            <a:schemeClr val="dk1"/>
+          </a:fontRef>
+        </p:style>
+        <p:txBody>
+          <a:bodyPr rtlCol="0" anchor="ctr"/>
+          <a:lstStyle/>
+          <a:p>
+            <a:pPr algn="ctr"/>
+            <a:r>
+              <a:rPr lang="en-IN" b="1" dirty="0">
+                <a:latin typeface="Courier New" panose="02070309020205020404" pitchFamily="49" charset="0"/>
+                <a:cs typeface="Courier New" panose="02070309020205020404" pitchFamily="49" charset="0"/>
+              </a:rPr>
+              <a:t>Test Suite Execution Video Recording Link: </a:t>
+            </a:r>
+            <a:r>
+              <a:rPr lang="en-US" sz="1800" u="sng" dirty="0">
+                <a:solidFill>
+                  <a:srgbClr val="0000FF"/>
+                </a:solidFill>
+                <a:effectLst/>
+                <a:latin typeface="Calibri" panose="020F0502020204030204" pitchFamily="34" charset="0"/>
+                <a:ea typeface="Times New Roman" panose="02020603050405020304" pitchFamily="18" charset="0"/>
+                <a:cs typeface="Times New Roman" panose="02020603050405020304" pitchFamily="18" charset="0"/>
+                <a:hlinkClick r:id="rId6"/>
+              </a:rPr>
+              <a:t>https://youtu.be/PPhemafx0kg</a:t>
+            </a:r>
+            <a:endParaRPr lang="en-US" dirty="0">
+              <a:solidFill>
+                <a:srgbClr val="0000FF"/>
+              </a:solidFill>
+              <a:latin typeface="Calibri" panose="020F0502020204030204" pitchFamily="34" charset="0"/>
+              <a:cs typeface="Calibri" panose="020F0502020204030204" pitchFamily="34" charset="0"/>
+            </a:endParaRPr>
+          </a:p>
+        </p:txBody>
+      </p:sp>
     </p:spTree>
     <p:extLst>
       <p:ext uri="{BB962C8B-B14F-4D97-AF65-F5344CB8AC3E}">

</xml_diff>

<commit_message>
Correcting improper numbering made on Architecture Image
</commit_message>
<xml_diff>
--- a/AutomationFramewokTaskAssignmentSubmission.pptx
+++ b/AutomationFramewokTaskAssignmentSubmission.pptx
@@ -7363,10 +7363,10 @@
       </p:sp>
       <p:pic>
         <p:nvPicPr>
-          <p:cNvPr id="9" name="Picture 8">
+          <p:cNvPr id="3" name="Picture 2" descr="Diagram&#10;&#10;Description automatically generated">
             <a:extLst>
               <a:ext uri="{FF2B5EF4-FFF2-40B4-BE49-F238E27FC236}">
-                <a16:creationId xmlns:a16="http://schemas.microsoft.com/office/drawing/2014/main" id="{9DE13038-AC57-477B-9AD2-FEB085D94AB7}"/>
+                <a16:creationId xmlns:a16="http://schemas.microsoft.com/office/drawing/2014/main" id="{1A411734-4D26-409D-908C-B99523463C95}"/>
               </a:ext>
             </a:extLst>
           </p:cNvPr>
@@ -7376,15 +7376,21 @@
           <p:nvPr/>
         </p:nvPicPr>
         <p:blipFill>
-          <a:blip r:embed="rId2"/>
+          <a:blip r:embed="rId2">
+            <a:extLst>
+              <a:ext uri="{28A0092B-C50C-407E-A947-70E740481C1C}">
+                <a14:useLocalDpi xmlns:a14="http://schemas.microsoft.com/office/drawing/2010/main" val="0"/>
+              </a:ext>
+            </a:extLst>
+          </a:blip>
           <a:stretch>
             <a:fillRect/>
           </a:stretch>
         </p:blipFill>
         <p:spPr>
           <a:xfrm>
-            <a:off x="1266825" y="0"/>
-            <a:ext cx="9658350" cy="6858000"/>
+            <a:off x="1262514" y="0"/>
+            <a:ext cx="9666971" cy="6858000"/>
           </a:xfrm>
           <a:prstGeom prst="rect">
             <a:avLst/>

</xml_diff>

<commit_message>
Remove Console ReadKey from TestExecutor to run from CI/CD
</commit_message>
<xml_diff>
--- a/AutomationFramewokTaskAssignmentSubmission.pptx
+++ b/AutomationFramewokTaskAssignmentSubmission.pptx
@@ -8,8 +8,9 @@
     <p:sldId id="256" r:id="rId2"/>
     <p:sldId id="257" r:id="rId3"/>
     <p:sldId id="258" r:id="rId4"/>
-    <p:sldId id="260" r:id="rId5"/>
-    <p:sldId id="261" r:id="rId6"/>
+    <p:sldId id="262" r:id="rId5"/>
+    <p:sldId id="260" r:id="rId6"/>
+    <p:sldId id="261" r:id="rId7"/>
   </p:sldIdLst>
   <p:sldSz cx="12192000" cy="6858000"/>
   <p:notesSz cx="6858000" cy="9144000"/>
@@ -6961,13 +6962,13 @@
           <p:nvPr>
             <p:extLst>
               <p:ext uri="{D42A27DB-BD31-4B8C-83A1-F6EECF244321}">
-                <p14:modId xmlns:p14="http://schemas.microsoft.com/office/powerpoint/2010/main" val="2098295987"/>
+                <p14:modId xmlns:p14="http://schemas.microsoft.com/office/powerpoint/2010/main" val="1060653336"/>
               </p:ext>
             </p:extLst>
           </p:nvPr>
         </p:nvGraphicFramePr>
         <p:xfrm>
-          <a:off x="1057012" y="2246542"/>
+          <a:off x="1971412" y="2293126"/>
           <a:ext cx="7633982" cy="3483139"/>
         </p:xfrm>
         <a:graphic>
@@ -6990,7 +6991,7 @@
         </p:nvSpPr>
         <p:spPr>
           <a:xfrm>
-            <a:off x="2600586" y="5115374"/>
+            <a:off x="3514986" y="5161958"/>
             <a:ext cx="4546833" cy="369332"/>
           </a:xfrm>
           <a:prstGeom prst="rect">
@@ -7411,6 +7412,281 @@
 </file>
 
 <file path=ppt/slides/slide4.xml><?xml version="1.0" encoding="utf-8"?>
+<p:sld xmlns:a="http://schemas.openxmlformats.org/drawingml/2006/main" xmlns:r="http://schemas.openxmlformats.org/officeDocument/2006/relationships" xmlns:p="http://schemas.openxmlformats.org/presentationml/2006/main">
+  <p:cSld>
+    <p:spTree>
+      <p:nvGrpSpPr>
+        <p:cNvPr id="1" name=""/>
+        <p:cNvGrpSpPr/>
+        <p:nvPr/>
+      </p:nvGrpSpPr>
+      <p:grpSpPr>
+        <a:xfrm>
+          <a:off x="0" y="0"/>
+          <a:ext cx="0" cy="0"/>
+          <a:chOff x="0" y="0"/>
+          <a:chExt cx="0" cy="0"/>
+        </a:xfrm>
+      </p:grpSpPr>
+      <p:sp>
+        <p:nvSpPr>
+          <p:cNvPr id="7" name="Rectangle 6">
+            <a:extLst>
+              <a:ext uri="{FF2B5EF4-FFF2-40B4-BE49-F238E27FC236}">
+                <a16:creationId xmlns:a16="http://schemas.microsoft.com/office/drawing/2014/main" id="{20604614-7113-4181-8E9C-C90FEDF1594C}"/>
+              </a:ext>
+            </a:extLst>
+          </p:cNvPr>
+          <p:cNvSpPr/>
+          <p:nvPr/>
+        </p:nvSpPr>
+        <p:spPr>
+          <a:xfrm>
+            <a:off x="360726" y="0"/>
+            <a:ext cx="11831273" cy="6858000"/>
+          </a:xfrm>
+          <a:prstGeom prst="rect">
+            <a:avLst/>
+          </a:prstGeom>
+          <a:solidFill>
+            <a:schemeClr val="bg1"/>
+          </a:solidFill>
+        </p:spPr>
+        <p:style>
+          <a:lnRef idx="2">
+            <a:schemeClr val="accent1">
+              <a:shade val="50000"/>
+            </a:schemeClr>
+          </a:lnRef>
+          <a:fillRef idx="1">
+            <a:schemeClr val="accent1"/>
+          </a:fillRef>
+          <a:effectRef idx="0">
+            <a:schemeClr val="accent1"/>
+          </a:effectRef>
+          <a:fontRef idx="minor">
+            <a:schemeClr val="lt1"/>
+          </a:fontRef>
+        </p:style>
+        <p:txBody>
+          <a:bodyPr rtlCol="0" anchor="ctr"/>
+          <a:lstStyle/>
+          <a:p>
+            <a:pPr algn="ctr"/>
+            <a:endParaRPr lang="en-US"/>
+          </a:p>
+        </p:txBody>
+      </p:sp>
+      <p:sp>
+        <p:nvSpPr>
+          <p:cNvPr id="5" name="TextBox 4">
+            <a:extLst>
+              <a:ext uri="{FF2B5EF4-FFF2-40B4-BE49-F238E27FC236}">
+                <a16:creationId xmlns:a16="http://schemas.microsoft.com/office/drawing/2014/main" id="{9B5B6EF8-7EEB-454F-BD6E-2A466B8E5076}"/>
+              </a:ext>
+            </a:extLst>
+          </p:cNvPr>
+          <p:cNvSpPr txBox="1"/>
+          <p:nvPr/>
+        </p:nvSpPr>
+        <p:spPr>
+          <a:xfrm>
+            <a:off x="2600586" y="5115374"/>
+            <a:ext cx="4546833" cy="369332"/>
+          </a:xfrm>
+          <a:prstGeom prst="rect">
+            <a:avLst/>
+          </a:prstGeom>
+          <a:noFill/>
+        </p:spPr>
+        <p:txBody>
+          <a:bodyPr wrap="square" rtlCol="0">
+            <a:spAutoFit/>
+          </a:bodyPr>
+          <a:lstStyle/>
+          <a:p>
+            <a:r>
+              <a:rPr lang="en-IN" dirty="0">
+                <a:solidFill>
+                  <a:schemeClr val="bg1"/>
+                </a:solidFill>
+              </a:rPr>
+              <a:t>HYBRID AUTOMATION FRAMEWORK</a:t>
+            </a:r>
+            <a:endParaRPr lang="en-US" dirty="0">
+              <a:solidFill>
+                <a:schemeClr val="bg1"/>
+              </a:solidFill>
+            </a:endParaRPr>
+          </a:p>
+        </p:txBody>
+      </p:sp>
+      <p:sp>
+        <p:nvSpPr>
+          <p:cNvPr id="6" name="Rectangle 5">
+            <a:extLst>
+              <a:ext uri="{FF2B5EF4-FFF2-40B4-BE49-F238E27FC236}">
+                <a16:creationId xmlns:a16="http://schemas.microsoft.com/office/drawing/2014/main" id="{05AE5BA4-2605-4C7D-9EF2-77FA970822DA}"/>
+              </a:ext>
+            </a:extLst>
+          </p:cNvPr>
+          <p:cNvSpPr/>
+          <p:nvPr/>
+        </p:nvSpPr>
+        <p:spPr>
+          <a:xfrm>
+            <a:off x="-14288" y="0"/>
+            <a:ext cx="375015" cy="6858000"/>
+          </a:xfrm>
+          <a:prstGeom prst="rect">
+            <a:avLst/>
+          </a:prstGeom>
+          <a:gradFill flip="none" rotWithShape="1">
+            <a:gsLst>
+              <a:gs pos="0">
+                <a:schemeClr val="accent1">
+                  <a:satMod val="103000"/>
+                  <a:lumMod val="102000"/>
+                  <a:tint val="94000"/>
+                </a:schemeClr>
+              </a:gs>
+              <a:gs pos="50000">
+                <a:schemeClr val="accent1">
+                  <a:satMod val="110000"/>
+                  <a:lumMod val="100000"/>
+                  <a:shade val="100000"/>
+                </a:schemeClr>
+              </a:gs>
+              <a:gs pos="100000">
+                <a:schemeClr val="accent1">
+                  <a:lumMod val="99000"/>
+                  <a:satMod val="120000"/>
+                  <a:shade val="78000"/>
+                </a:schemeClr>
+              </a:gs>
+            </a:gsLst>
+            <a:lin ang="16200000" scaled="1"/>
+            <a:tileRect/>
+          </a:gradFill>
+        </p:spPr>
+        <p:style>
+          <a:lnRef idx="1">
+            <a:schemeClr val="accent1"/>
+          </a:lnRef>
+          <a:fillRef idx="3">
+            <a:schemeClr val="accent1"/>
+          </a:fillRef>
+          <a:effectRef idx="2">
+            <a:schemeClr val="accent1"/>
+          </a:effectRef>
+          <a:fontRef idx="minor">
+            <a:schemeClr val="lt1"/>
+          </a:fontRef>
+        </p:style>
+        <p:txBody>
+          <a:bodyPr rtlCol="0" anchor="ctr"/>
+          <a:lstStyle/>
+          <a:p>
+            <a:pPr algn="ctr"/>
+            <a:r>
+              <a:rPr lang="en-IN" dirty="0"/>
+              <a:t>COMPONENT</a:t>
+            </a:r>
+          </a:p>
+          <a:p>
+            <a:pPr algn="ctr"/>
+            <a:endParaRPr lang="en-IN" dirty="0"/>
+          </a:p>
+          <a:p>
+            <a:pPr algn="ctr"/>
+            <a:r>
+              <a:rPr lang="en-IN" dirty="0"/>
+              <a:t> DIAGRAM</a:t>
+            </a:r>
+            <a:endParaRPr lang="en-US" dirty="0"/>
+          </a:p>
+        </p:txBody>
+      </p:sp>
+      <p:pic>
+        <p:nvPicPr>
+          <p:cNvPr id="9" name="Picture 8" descr="Diagram&#10;&#10;Description automatically generated">
+            <a:extLst>
+              <a:ext uri="{FF2B5EF4-FFF2-40B4-BE49-F238E27FC236}">
+                <a16:creationId xmlns:a16="http://schemas.microsoft.com/office/drawing/2014/main" id="{764640E4-D339-4F7E-BA68-6CCFB6E02B1C}"/>
+              </a:ext>
+            </a:extLst>
+          </p:cNvPr>
+          <p:cNvPicPr>
+            <a:picLocks noChangeAspect="1"/>
+          </p:cNvPicPr>
+          <p:nvPr/>
+        </p:nvPicPr>
+        <p:blipFill>
+          <a:blip r:embed="rId2">
+            <a:extLst>
+              <a:ext uri="{28A0092B-C50C-407E-A947-70E740481C1C}">
+                <a14:useLocalDpi xmlns:a14="http://schemas.microsoft.com/office/drawing/2010/main" val="0"/>
+              </a:ext>
+            </a:extLst>
+          </a:blip>
+          <a:stretch>
+            <a:fillRect/>
+          </a:stretch>
+        </p:blipFill>
+        <p:spPr>
+          <a:xfrm>
+            <a:off x="360725" y="0"/>
+            <a:ext cx="9984200" cy="6858000"/>
+          </a:xfrm>
+          <a:prstGeom prst="rect">
+            <a:avLst/>
+          </a:prstGeom>
+        </p:spPr>
+      </p:pic>
+      <p:pic>
+        <p:nvPicPr>
+          <p:cNvPr id="11" name="Picture 10">
+            <a:extLst>
+              <a:ext uri="{FF2B5EF4-FFF2-40B4-BE49-F238E27FC236}">
+                <a16:creationId xmlns:a16="http://schemas.microsoft.com/office/drawing/2014/main" id="{99F0CF02-406D-407D-B3DF-B707B17C56BC}"/>
+              </a:ext>
+            </a:extLst>
+          </p:cNvPr>
+          <p:cNvPicPr>
+            <a:picLocks noChangeAspect="1"/>
+          </p:cNvPicPr>
+          <p:nvPr/>
+        </p:nvPicPr>
+        <p:blipFill>
+          <a:blip r:embed="rId3"/>
+          <a:stretch>
+            <a:fillRect/>
+          </a:stretch>
+        </p:blipFill>
+        <p:spPr>
+          <a:xfrm>
+            <a:off x="9409888" y="-1"/>
+            <a:ext cx="2782111" cy="2421467"/>
+          </a:xfrm>
+          <a:prstGeom prst="rect">
+            <a:avLst/>
+          </a:prstGeom>
+        </p:spPr>
+      </p:pic>
+    </p:spTree>
+    <p:extLst>
+      <p:ext uri="{BB962C8B-B14F-4D97-AF65-F5344CB8AC3E}">
+        <p14:creationId xmlns:p14="http://schemas.microsoft.com/office/powerpoint/2010/main" val="2553869048"/>
+      </p:ext>
+    </p:extLst>
+  </p:cSld>
+  <p:clrMapOvr>
+    <a:masterClrMapping/>
+  </p:clrMapOvr>
+</p:sld>
+</file>
+
+<file path=ppt/slides/slide5.xml><?xml version="1.0" encoding="utf-8"?>
 <p:sld xmlns:a="http://schemas.openxmlformats.org/drawingml/2006/main" xmlns:r="http://schemas.openxmlformats.org/officeDocument/2006/relationships" xmlns:p="http://schemas.openxmlformats.org/presentationml/2006/main">
   <p:cSld>
     <p:spTree>
@@ -9492,7 +9768,7 @@
 </p:sld>
 </file>
 
-<file path=ppt/slides/slide5.xml><?xml version="1.0" encoding="utf-8"?>
+<file path=ppt/slides/slide6.xml><?xml version="1.0" encoding="utf-8"?>
 <p:sld xmlns:a="http://schemas.openxmlformats.org/drawingml/2006/main" xmlns:r="http://schemas.openxmlformats.org/officeDocument/2006/relationships" xmlns:p="http://schemas.openxmlformats.org/presentationml/2006/main">
   <p:cSld>
     <p:spTree>

</xml_diff>